<commit_message>
Add section 1+N Hibernate
</commit_message>
<xml_diff>
--- a/Актуальные вопросы на собеседовании.pptx
+++ b/Актуальные вопросы на собеседовании.pptx
@@ -22,23 +22,24 @@
     <p:sldId id="260" r:id="rId16"/>
     <p:sldId id="267" r:id="rId17"/>
     <p:sldId id="268" r:id="rId18"/>
-    <p:sldId id="269" r:id="rId19"/>
-    <p:sldId id="277" r:id="rId20"/>
-    <p:sldId id="273" r:id="rId21"/>
-    <p:sldId id="270" r:id="rId22"/>
-    <p:sldId id="271" r:id="rId23"/>
-    <p:sldId id="272" r:id="rId24"/>
-    <p:sldId id="274" r:id="rId25"/>
-    <p:sldId id="278" r:id="rId26"/>
-    <p:sldId id="279" r:id="rId27"/>
-    <p:sldId id="280" r:id="rId28"/>
-    <p:sldId id="283" r:id="rId29"/>
-    <p:sldId id="281" r:id="rId30"/>
-    <p:sldId id="282" r:id="rId31"/>
-    <p:sldId id="284" r:id="rId32"/>
-    <p:sldId id="285" r:id="rId33"/>
-    <p:sldId id="286" r:id="rId34"/>
-    <p:sldId id="287" r:id="rId35"/>
+    <p:sldId id="290" r:id="rId19"/>
+    <p:sldId id="269" r:id="rId20"/>
+    <p:sldId id="277" r:id="rId21"/>
+    <p:sldId id="273" r:id="rId22"/>
+    <p:sldId id="270" r:id="rId23"/>
+    <p:sldId id="271" r:id="rId24"/>
+    <p:sldId id="272" r:id="rId25"/>
+    <p:sldId id="274" r:id="rId26"/>
+    <p:sldId id="278" r:id="rId27"/>
+    <p:sldId id="279" r:id="rId28"/>
+    <p:sldId id="280" r:id="rId29"/>
+    <p:sldId id="283" r:id="rId30"/>
+    <p:sldId id="281" r:id="rId31"/>
+    <p:sldId id="282" r:id="rId32"/>
+    <p:sldId id="284" r:id="rId33"/>
+    <p:sldId id="285" r:id="rId34"/>
+    <p:sldId id="286" r:id="rId35"/>
+    <p:sldId id="287" r:id="rId36"/>
   </p:sldIdLst>
   <p:sldSz cx="12192000" cy="6858000"/>
   <p:notesSz cx="6858000" cy="9144000"/>
@@ -867,7 +868,7 @@
           <a:p>
             <a:fld id="{4A20A7E1-E9F6-4B81-8F48-56153317D57C}" type="datetimeFigureOut">
               <a:rPr lang="en-US" smtClean="0"/>
-              <a:t>7/14/2025</a:t>
+              <a:t>7/15/2025</a:t>
             </a:fld>
             <a:endParaRPr lang="en-US"/>
           </a:p>
@@ -1118,7 +1119,7 @@
           <a:p>
             <a:fld id="{4A20A7E1-E9F6-4B81-8F48-56153317D57C}" type="datetimeFigureOut">
               <a:rPr lang="en-US" smtClean="0"/>
-              <a:t>7/14/2025</a:t>
+              <a:t>7/15/2025</a:t>
             </a:fld>
             <a:endParaRPr lang="en-US"/>
           </a:p>
@@ -1432,7 +1433,7 @@
           <a:p>
             <a:fld id="{4A20A7E1-E9F6-4B81-8F48-56153317D57C}" type="datetimeFigureOut">
               <a:rPr lang="en-US" smtClean="0"/>
-              <a:t>7/14/2025</a:t>
+              <a:t>7/15/2025</a:t>
             </a:fld>
             <a:endParaRPr lang="en-US"/>
           </a:p>
@@ -1773,7 +1774,7 @@
           <a:p>
             <a:fld id="{4A20A7E1-E9F6-4B81-8F48-56153317D57C}" type="datetimeFigureOut">
               <a:rPr lang="en-US" smtClean="0"/>
-              <a:t>7/14/2025</a:t>
+              <a:t>7/15/2025</a:t>
             </a:fld>
             <a:endParaRPr lang="en-US"/>
           </a:p>
@@ -2087,7 +2088,7 @@
           <a:p>
             <a:fld id="{4A20A7E1-E9F6-4B81-8F48-56153317D57C}" type="datetimeFigureOut">
               <a:rPr lang="en-US" smtClean="0"/>
-              <a:t>7/14/2025</a:t>
+              <a:t>7/15/2025</a:t>
             </a:fld>
             <a:endParaRPr lang="en-US"/>
           </a:p>
@@ -2480,7 +2481,7 @@
           <a:p>
             <a:fld id="{4A20A7E1-E9F6-4B81-8F48-56153317D57C}" type="datetimeFigureOut">
               <a:rPr lang="en-US" smtClean="0"/>
-              <a:t>7/14/2025</a:t>
+              <a:t>7/15/2025</a:t>
             </a:fld>
             <a:endParaRPr lang="en-US"/>
           </a:p>
@@ -2650,7 +2651,7 @@
           <a:p>
             <a:fld id="{4A20A7E1-E9F6-4B81-8F48-56153317D57C}" type="datetimeFigureOut">
               <a:rPr lang="en-US" smtClean="0"/>
-              <a:t>7/14/2025</a:t>
+              <a:t>7/15/2025</a:t>
             </a:fld>
             <a:endParaRPr lang="en-US"/>
           </a:p>
@@ -2830,7 +2831,7 @@
           <a:p>
             <a:fld id="{4A20A7E1-E9F6-4B81-8F48-56153317D57C}" type="datetimeFigureOut">
               <a:rPr lang="en-US" smtClean="0"/>
-              <a:t>7/14/2025</a:t>
+              <a:t>7/15/2025</a:t>
             </a:fld>
             <a:endParaRPr lang="en-US"/>
           </a:p>
@@ -3006,7 +3007,7 @@
           <a:p>
             <a:fld id="{4A20A7E1-E9F6-4B81-8F48-56153317D57C}" type="datetimeFigureOut">
               <a:rPr lang="en-US" smtClean="0"/>
-              <a:t>7/14/2025</a:t>
+              <a:t>7/15/2025</a:t>
             </a:fld>
             <a:endParaRPr lang="en-US"/>
           </a:p>
@@ -3253,7 +3254,7 @@
           <a:p>
             <a:fld id="{4A20A7E1-E9F6-4B81-8F48-56153317D57C}" type="datetimeFigureOut">
               <a:rPr lang="en-US" smtClean="0"/>
-              <a:t>7/14/2025</a:t>
+              <a:t>7/15/2025</a:t>
             </a:fld>
             <a:endParaRPr lang="en-US"/>
           </a:p>
@@ -3485,7 +3486,7 @@
           <a:p>
             <a:fld id="{4A20A7E1-E9F6-4B81-8F48-56153317D57C}" type="datetimeFigureOut">
               <a:rPr lang="en-US" smtClean="0"/>
-              <a:t>7/14/2025</a:t>
+              <a:t>7/15/2025</a:t>
             </a:fld>
             <a:endParaRPr lang="en-US"/>
           </a:p>
@@ -3859,7 +3860,7 @@
           <a:p>
             <a:fld id="{4A20A7E1-E9F6-4B81-8F48-56153317D57C}" type="datetimeFigureOut">
               <a:rPr lang="en-US" smtClean="0"/>
-              <a:t>7/14/2025</a:t>
+              <a:t>7/15/2025</a:t>
             </a:fld>
             <a:endParaRPr lang="en-US"/>
           </a:p>
@@ -3982,7 +3983,7 @@
           <a:p>
             <a:fld id="{4A20A7E1-E9F6-4B81-8F48-56153317D57C}" type="datetimeFigureOut">
               <a:rPr lang="en-US" smtClean="0"/>
-              <a:t>7/14/2025</a:t>
+              <a:t>7/15/2025</a:t>
             </a:fld>
             <a:endParaRPr lang="en-US"/>
           </a:p>
@@ -4077,7 +4078,7 @@
           <a:p>
             <a:fld id="{4A20A7E1-E9F6-4B81-8F48-56153317D57C}" type="datetimeFigureOut">
               <a:rPr lang="en-US" smtClean="0"/>
-              <a:t>7/14/2025</a:t>
+              <a:t>7/15/2025</a:t>
             </a:fld>
             <a:endParaRPr lang="en-US"/>
           </a:p>
@@ -4332,7 +4333,7 @@
           <a:p>
             <a:fld id="{4A20A7E1-E9F6-4B81-8F48-56153317D57C}" type="datetimeFigureOut">
               <a:rPr lang="en-US" smtClean="0"/>
-              <a:t>7/14/2025</a:t>
+              <a:t>7/15/2025</a:t>
             </a:fld>
             <a:endParaRPr lang="en-US"/>
           </a:p>
@@ -4595,7 +4596,7 @@
           <a:p>
             <a:fld id="{4A20A7E1-E9F6-4B81-8F48-56153317D57C}" type="datetimeFigureOut">
               <a:rPr lang="en-US" smtClean="0"/>
-              <a:t>7/14/2025</a:t>
+              <a:t>7/15/2025</a:t>
             </a:fld>
             <a:endParaRPr lang="en-US"/>
           </a:p>
@@ -5338,7 +5339,7 @@
           <a:p>
             <a:fld id="{4A20A7E1-E9F6-4B81-8F48-56153317D57C}" type="datetimeFigureOut">
               <a:rPr lang="en-US" smtClean="0"/>
-              <a:t>7/14/2025</a:t>
+              <a:t>7/15/2025</a:t>
             </a:fld>
             <a:endParaRPr lang="en-US"/>
           </a:p>
@@ -7750,6 +7751,408 @@
           <p:cNvPr id="2" name="Title 1">
             <a:extLst>
               <a:ext uri="{FF2B5EF4-FFF2-40B4-BE49-F238E27FC236}">
+                <a16:creationId xmlns:a16="http://schemas.microsoft.com/office/drawing/2014/main" id="{9EF21D30-4186-F68F-B79F-EBC91155AD03}"/>
+              </a:ext>
+            </a:extLst>
+          </p:cNvPr>
+          <p:cNvSpPr>
+            <a:spLocks noGrp="1"/>
+          </p:cNvSpPr>
+          <p:nvPr>
+            <p:ph type="title"/>
+          </p:nvPr>
+        </p:nvSpPr>
+        <p:spPr/>
+        <p:txBody>
+          <a:bodyPr/>
+          <a:lstStyle/>
+          <a:p>
+            <a:pPr algn="ctr"/>
+            <a:r>
+              <a:rPr lang="en-US" dirty="0"/>
+              <a:t>N+1 Hibernate</a:t>
+            </a:r>
+          </a:p>
+        </p:txBody>
+      </p:sp>
+      <p:sp>
+        <p:nvSpPr>
+          <p:cNvPr id="3" name="Content Placeholder 2">
+            <a:extLst>
+              <a:ext uri="{FF2B5EF4-FFF2-40B4-BE49-F238E27FC236}">
+                <a16:creationId xmlns:a16="http://schemas.microsoft.com/office/drawing/2014/main" id="{3CBB3CB0-7243-A4D9-C015-88310A6553FC}"/>
+              </a:ext>
+            </a:extLst>
+          </p:cNvPr>
+          <p:cNvSpPr>
+            <a:spLocks noGrp="1"/>
+          </p:cNvSpPr>
+          <p:nvPr>
+            <p:ph idx="1"/>
+          </p:nvPr>
+        </p:nvSpPr>
+        <p:spPr>
+          <a:xfrm>
+            <a:off x="677334" y="2160589"/>
+            <a:ext cx="9690348" cy="3880773"/>
+          </a:xfrm>
+        </p:spPr>
+        <p:txBody>
+          <a:bodyPr>
+            <a:normAutofit fontScale="85000" lnSpcReduction="10000"/>
+          </a:bodyPr>
+          <a:lstStyle/>
+          <a:p>
+            <a:r>
+              <a:rPr lang="ru-RU" i="1" dirty="0"/>
+              <a:t>Если мы не используем значения из поля соединённой таблицы то:</a:t>
+            </a:r>
+          </a:p>
+          <a:p>
+            <a:pPr marL="0" indent="0">
+              <a:buNone/>
+            </a:pPr>
+            <a:r>
+              <a:rPr lang="ru-RU" i="1" dirty="0"/>
+              <a:t>@OneToMany</a:t>
+            </a:r>
+            <a:r>
+              <a:rPr lang="ru-RU" dirty="0"/>
+              <a:t> по умолчанию использует ленивую выборку</a:t>
+            </a:r>
+            <a:endParaRPr lang="en-US" dirty="0"/>
+          </a:p>
+          <a:p>
+            <a:r>
+              <a:rPr lang="ru-RU" dirty="0"/>
+              <a:t>Если нам нужны значения поля то можно </a:t>
+            </a:r>
+            <a:r>
+              <a:rPr lang="ru-RU" dirty="0" err="1"/>
+              <a:t>доюавить</a:t>
+            </a:r>
+            <a:r>
+              <a:rPr lang="ru-RU" dirty="0"/>
+              <a:t> </a:t>
+            </a:r>
+            <a:r>
+              <a:rPr lang="en-US" dirty="0"/>
+              <a:t>fetch = </a:t>
+            </a:r>
+            <a:r>
+              <a:rPr lang="en-US" dirty="0" err="1"/>
+              <a:t>FetchType.EAGER</a:t>
+            </a:r>
+            <a:r>
+              <a:rPr lang="ru-RU" dirty="0"/>
+              <a:t>:</a:t>
+            </a:r>
+          </a:p>
+          <a:p>
+            <a:pPr marL="0" indent="0">
+              <a:buNone/>
+            </a:pPr>
+            <a:r>
+              <a:rPr lang="en-US" dirty="0"/>
+              <a:t>@OneToMany(cascade = </a:t>
+            </a:r>
+            <a:r>
+              <a:rPr lang="en-US" dirty="0" err="1"/>
+              <a:t>CascadeType.ALL</a:t>
+            </a:r>
+            <a:r>
+              <a:rPr lang="en-US" dirty="0"/>
+              <a:t>, </a:t>
+            </a:r>
+            <a:r>
+              <a:rPr lang="en-US" dirty="0" err="1"/>
+              <a:t>mappedBy</a:t>
+            </a:r>
+            <a:r>
+              <a:rPr lang="en-US" dirty="0"/>
+              <a:t> = "author", fetch = </a:t>
+            </a:r>
+            <a:r>
+              <a:rPr lang="en-US" dirty="0" err="1"/>
+              <a:t>FetchType.EAGER</a:t>
+            </a:r>
+            <a:r>
+              <a:rPr lang="en-US" dirty="0"/>
+              <a:t>)</a:t>
+            </a:r>
+            <a:endParaRPr lang="ru-RU" dirty="0"/>
+          </a:p>
+          <a:p>
+            <a:r>
+              <a:rPr lang="ru-RU" dirty="0"/>
+              <a:t>Написать кастомный запрос </a:t>
+            </a:r>
+            <a:r>
+              <a:rPr lang="ru-RU" dirty="0" err="1"/>
+              <a:t>Hibernates</a:t>
+            </a:r>
+            <a:r>
+              <a:rPr lang="ru-RU" dirty="0"/>
+              <a:t> использует</a:t>
+            </a:r>
+            <a:r>
+              <a:rPr lang="en-US" dirty="0"/>
+              <a:t> </a:t>
+            </a:r>
+            <a:r>
+              <a:rPr lang="ru-RU" dirty="0"/>
+              <a:t>операторы JOIN </a:t>
+            </a:r>
+            <a:r>
+              <a:rPr lang="en-US" dirty="0"/>
+              <a:t>FETCH</a:t>
+            </a:r>
+            <a:r>
+              <a:rPr lang="ru-RU" dirty="0"/>
+              <a:t>, создавая декартово произведение</a:t>
+            </a:r>
+            <a:endParaRPr lang="ru-RU" b="1" dirty="0"/>
+          </a:p>
+          <a:p>
+            <a:r>
+              <a:rPr lang="ru-RU" dirty="0"/>
+              <a:t>Использовать </a:t>
+            </a:r>
+            <a:r>
+              <a:rPr lang="ru-RU" dirty="0" err="1"/>
+              <a:t>анотацию</a:t>
+            </a:r>
+            <a:r>
+              <a:rPr lang="ru-RU" dirty="0"/>
+              <a:t> </a:t>
+            </a:r>
+            <a:r>
+              <a:rPr lang="en-US" dirty="0"/>
+              <a:t>@EntityGraph</a:t>
+            </a:r>
+            <a:r>
+              <a:rPr lang="ru-RU" dirty="0"/>
+              <a:t> и перечислить в ней поля которые мы планируем использовать </a:t>
+            </a:r>
+          </a:p>
+          <a:p>
+            <a:pPr marL="0" indent="0">
+              <a:buNone/>
+            </a:pPr>
+            <a:r>
+              <a:rPr lang="ru-RU" dirty="0"/>
+              <a:t> 							</a:t>
+            </a:r>
+            <a:r>
+              <a:rPr lang="en-US" dirty="0">
+                <a:solidFill>
+                  <a:schemeClr val="accent2"/>
+                </a:solidFill>
+              </a:rPr>
+              <a:t>@EntityGraph(type = </a:t>
+            </a:r>
+            <a:r>
+              <a:rPr lang="en-US" dirty="0" err="1">
+                <a:solidFill>
+                  <a:schemeClr val="accent2"/>
+                </a:solidFill>
+              </a:rPr>
+              <a:t>EntityGraphType.FETCH</a:t>
+            </a:r>
+            <a:r>
+              <a:rPr lang="en-US" dirty="0">
+                <a:solidFill>
+                  <a:schemeClr val="accent2"/>
+                </a:solidFill>
+              </a:rPr>
+              <a:t>,</a:t>
+            </a:r>
+          </a:p>
+          <a:p>
+            <a:pPr marL="0" indent="0">
+              <a:buNone/>
+            </a:pPr>
+            <a:r>
+              <a:rPr lang="en-US" dirty="0">
+                <a:solidFill>
+                  <a:schemeClr val="accent2"/>
+                </a:solidFill>
+              </a:rPr>
+              <a:t>  </a:t>
+            </a:r>
+            <a:r>
+              <a:rPr lang="ru-RU" dirty="0">
+                <a:solidFill>
+                  <a:schemeClr val="accent2"/>
+                </a:solidFill>
+              </a:rPr>
+              <a:t>									    </a:t>
+            </a:r>
+            <a:r>
+              <a:rPr lang="en-US" dirty="0">
+                <a:solidFill>
+                  <a:schemeClr val="accent2"/>
+                </a:solidFill>
+              </a:rPr>
+              <a:t>  </a:t>
+            </a:r>
+            <a:r>
+              <a:rPr lang="en-US" dirty="0" err="1">
+                <a:solidFill>
+                  <a:schemeClr val="accent2"/>
+                </a:solidFill>
+              </a:rPr>
+              <a:t>attributePaths</a:t>
+            </a:r>
+            <a:r>
+              <a:rPr lang="en-US" dirty="0">
+                <a:solidFill>
+                  <a:schemeClr val="accent2"/>
+                </a:solidFill>
+              </a:rPr>
+              <a:t> = {</a:t>
+            </a:r>
+          </a:p>
+          <a:p>
+            <a:pPr marL="0" indent="0">
+              <a:buNone/>
+            </a:pPr>
+            <a:r>
+              <a:rPr lang="en-US" dirty="0">
+                <a:solidFill>
+                  <a:schemeClr val="accent2"/>
+                </a:solidFill>
+              </a:rPr>
+              <a:t>      </a:t>
+            </a:r>
+            <a:r>
+              <a:rPr lang="ru-RU" dirty="0">
+                <a:solidFill>
+                  <a:schemeClr val="accent2"/>
+                </a:solidFill>
+              </a:rPr>
+              <a:t>												         </a:t>
+            </a:r>
+            <a:r>
+              <a:rPr lang="en-US" dirty="0">
+                <a:solidFill>
+                  <a:schemeClr val="accent2"/>
+                </a:solidFill>
+              </a:rPr>
+              <a:t>"language",</a:t>
+            </a:r>
+          </a:p>
+          <a:p>
+            <a:pPr marL="0" indent="0">
+              <a:buNone/>
+            </a:pPr>
+            <a:r>
+              <a:rPr lang="en-US" dirty="0">
+                <a:solidFill>
+                  <a:schemeClr val="accent2"/>
+                </a:solidFill>
+              </a:rPr>
+              <a:t>    </a:t>
+            </a:r>
+            <a:r>
+              <a:rPr lang="ru-RU" dirty="0">
+                <a:solidFill>
+                  <a:schemeClr val="accent2"/>
+                </a:solidFill>
+              </a:rPr>
+              <a:t>												       </a:t>
+            </a:r>
+            <a:r>
+              <a:rPr lang="en-US" dirty="0">
+                <a:solidFill>
+                  <a:schemeClr val="accent2"/>
+                </a:solidFill>
+              </a:rPr>
+              <a:t>  "</a:t>
+            </a:r>
+            <a:r>
+              <a:rPr lang="en-US" dirty="0" err="1">
+                <a:solidFill>
+                  <a:schemeClr val="accent2"/>
+                </a:solidFill>
+              </a:rPr>
+              <a:t>filmActors</a:t>
+            </a:r>
+            <a:r>
+              <a:rPr lang="en-US" dirty="0">
+                <a:solidFill>
+                  <a:schemeClr val="accent2"/>
+                </a:solidFill>
+              </a:rPr>
+              <a:t>",</a:t>
+            </a:r>
+          </a:p>
+          <a:p>
+            <a:pPr marL="0" indent="0">
+              <a:buNone/>
+            </a:pPr>
+            <a:r>
+              <a:rPr lang="en-US" dirty="0">
+                <a:solidFill>
+                  <a:schemeClr val="accent2"/>
+                </a:solidFill>
+              </a:rPr>
+              <a:t>  </a:t>
+            </a:r>
+            <a:r>
+              <a:rPr lang="ru-RU" dirty="0">
+                <a:solidFill>
+                  <a:schemeClr val="accent2"/>
+                </a:solidFill>
+              </a:rPr>
+              <a:t>												     </a:t>
+            </a:r>
+            <a:r>
+              <a:rPr lang="en-US" dirty="0">
+                <a:solidFill>
+                  <a:schemeClr val="accent2"/>
+                </a:solidFill>
+              </a:rPr>
+              <a:t>  })</a:t>
+            </a:r>
+          </a:p>
+        </p:txBody>
+      </p:sp>
+    </p:spTree>
+    <p:extLst>
+      <p:ext uri="{BB962C8B-B14F-4D97-AF65-F5344CB8AC3E}">
+        <p14:creationId xmlns:p14="http://schemas.microsoft.com/office/powerpoint/2010/main" val="118213183"/>
+      </p:ext>
+    </p:extLst>
+  </p:cSld>
+  <p:clrMapOvr>
+    <a:masterClrMapping/>
+  </p:clrMapOvr>
+</p:sld>
+</file>
+
+<file path=ppt/slides/slide19.xml><?xml version="1.0" encoding="utf-8"?>
+<p:sld xmlns:a="http://schemas.openxmlformats.org/drawingml/2006/main" xmlns:r="http://schemas.openxmlformats.org/officeDocument/2006/relationships" xmlns:p="http://schemas.openxmlformats.org/presentationml/2006/main">
+  <p:cSld>
+    <p:spTree>
+      <p:nvGrpSpPr>
+        <p:cNvPr id="1" name=""/>
+        <p:cNvGrpSpPr/>
+        <p:nvPr/>
+      </p:nvGrpSpPr>
+      <p:grpSpPr>
+        <a:xfrm>
+          <a:off x="0" y="0"/>
+          <a:ext cx="0" cy="0"/>
+          <a:chOff x="0" y="0"/>
+          <a:chExt cx="0" cy="0"/>
+        </a:xfrm>
+      </p:grpSpPr>
+      <p:sp>
+        <p:nvSpPr>
+          <p:cNvPr id="2" name="Title 1">
+            <a:extLst>
+              <a:ext uri="{FF2B5EF4-FFF2-40B4-BE49-F238E27FC236}">
                 <a16:creationId xmlns:a16="http://schemas.microsoft.com/office/drawing/2014/main" id="{5ECB109A-633C-D51B-1C79-28423C1DDD84}"/>
               </a:ext>
             </a:extLst>
@@ -8693,167 +9096,6 @@
 </p:sld>
 </file>
 
-<file path=ppt/slides/slide19.xml><?xml version="1.0" encoding="utf-8"?>
-<p:sld xmlns:a="http://schemas.openxmlformats.org/drawingml/2006/main" xmlns:r="http://schemas.openxmlformats.org/officeDocument/2006/relationships" xmlns:p="http://schemas.openxmlformats.org/presentationml/2006/main">
-  <p:cSld>
-    <p:spTree>
-      <p:nvGrpSpPr>
-        <p:cNvPr id="1" name=""/>
-        <p:cNvGrpSpPr/>
-        <p:nvPr/>
-      </p:nvGrpSpPr>
-      <p:grpSpPr>
-        <a:xfrm>
-          <a:off x="0" y="0"/>
-          <a:ext cx="0" cy="0"/>
-          <a:chOff x="0" y="0"/>
-          <a:chExt cx="0" cy="0"/>
-        </a:xfrm>
-      </p:grpSpPr>
-      <p:sp>
-        <p:nvSpPr>
-          <p:cNvPr id="2" name="Title 1">
-            <a:extLst>
-              <a:ext uri="{FF2B5EF4-FFF2-40B4-BE49-F238E27FC236}">
-                <a16:creationId xmlns:a16="http://schemas.microsoft.com/office/drawing/2014/main" id="{6B9BCD65-9DF0-9AC4-2778-EA108EA9A626}"/>
-              </a:ext>
-            </a:extLst>
-          </p:cNvPr>
-          <p:cNvSpPr>
-            <a:spLocks noGrp="1"/>
-          </p:cNvSpPr>
-          <p:nvPr>
-            <p:ph type="title"/>
-          </p:nvPr>
-        </p:nvSpPr>
-        <p:spPr/>
-        <p:txBody>
-          <a:bodyPr/>
-          <a:lstStyle/>
-          <a:p>
-            <a:pPr algn="ctr"/>
-            <a:r>
-              <a:rPr lang="en-US" dirty="0"/>
-              <a:t>SQL &amp; HAVING</a:t>
-            </a:r>
-          </a:p>
-        </p:txBody>
-      </p:sp>
-      <p:sp>
-        <p:nvSpPr>
-          <p:cNvPr id="3" name="Content Placeholder 2">
-            <a:extLst>
-              <a:ext uri="{FF2B5EF4-FFF2-40B4-BE49-F238E27FC236}">
-                <a16:creationId xmlns:a16="http://schemas.microsoft.com/office/drawing/2014/main" id="{A5C059B5-3E26-6BC6-C98E-3E10664CBA31}"/>
-              </a:ext>
-            </a:extLst>
-          </p:cNvPr>
-          <p:cNvSpPr>
-            <a:spLocks noGrp="1"/>
-          </p:cNvSpPr>
-          <p:nvPr>
-            <p:ph idx="1"/>
-          </p:nvPr>
-        </p:nvSpPr>
-        <p:spPr/>
-        <p:txBody>
-          <a:bodyPr/>
-          <a:lstStyle/>
-          <a:p>
-            <a:r>
-              <a:rPr lang="ru-RU" dirty="0"/>
-              <a:t>Представьте, что у вас есть таблица заказов с информацией о покупателях, товарах и суммах заказов. Вы хотите найти покупателей, которые потратили в сумме более 1000 рублей.</a:t>
-            </a:r>
-            <a:endParaRPr lang="en-US" dirty="0"/>
-          </a:p>
-          <a:p>
-            <a:endParaRPr lang="en-US" dirty="0"/>
-          </a:p>
-          <a:p>
-            <a:pPr marL="0" indent="0">
-              <a:buNone/>
-            </a:pPr>
-            <a:r>
-              <a:rPr lang="en-US" dirty="0"/>
-              <a:t>    SELECT    </a:t>
-            </a:r>
-            <a:r>
-              <a:rPr lang="en-US" dirty="0" err="1"/>
-              <a:t>customer_id</a:t>
-            </a:r>
-            <a:r>
-              <a:rPr lang="en-US" dirty="0"/>
-              <a:t>,    SUM(</a:t>
-            </a:r>
-            <a:r>
-              <a:rPr lang="en-US" dirty="0" err="1"/>
-              <a:t>order_amount</a:t>
-            </a:r>
-            <a:r>
-              <a:rPr lang="en-US" dirty="0"/>
-              <a:t>) AS </a:t>
-            </a:r>
-            <a:r>
-              <a:rPr lang="en-US" dirty="0" err="1"/>
-              <a:t>total_spent</a:t>
-            </a:r>
-            <a:endParaRPr lang="en-US" dirty="0"/>
-          </a:p>
-          <a:p>
-            <a:pPr marL="0" indent="0">
-              <a:buNone/>
-            </a:pPr>
-            <a:r>
-              <a:rPr lang="en-US" dirty="0"/>
-              <a:t>       FROM    orders</a:t>
-            </a:r>
-          </a:p>
-          <a:p>
-            <a:pPr marL="0" indent="0">
-              <a:buNone/>
-            </a:pPr>
-            <a:r>
-              <a:rPr lang="en-US" dirty="0"/>
-              <a:t>GROUP BY    </a:t>
-            </a:r>
-            <a:r>
-              <a:rPr lang="en-US" dirty="0" err="1"/>
-              <a:t>customer_id</a:t>
-            </a:r>
-            <a:endParaRPr lang="en-US" dirty="0"/>
-          </a:p>
-          <a:p>
-            <a:pPr marL="0" indent="0">
-              <a:buNone/>
-            </a:pPr>
-            <a:r>
-              <a:rPr lang="en-US" dirty="0"/>
-              <a:t>    HAVING    SUM(</a:t>
-            </a:r>
-            <a:r>
-              <a:rPr lang="en-US" dirty="0" err="1"/>
-              <a:t>order_amount</a:t>
-            </a:r>
-            <a:r>
-              <a:rPr lang="en-US" dirty="0"/>
-              <a:t>) &gt; 1000;</a:t>
-            </a:r>
-          </a:p>
-        </p:txBody>
-      </p:sp>
-    </p:spTree>
-    <p:extLst>
-      <p:ext uri="{BB962C8B-B14F-4D97-AF65-F5344CB8AC3E}">
-        <p14:creationId xmlns:p14="http://schemas.microsoft.com/office/powerpoint/2010/main" val="2678335996"/>
-      </p:ext>
-    </p:extLst>
-  </p:cSld>
-  <p:clrMapOvr>
-    <a:masterClrMapping/>
-  </p:clrMapOvr>
-</p:sld>
-</file>
-
 <file path=ppt/slides/slide2.xml><?xml version="1.0" encoding="utf-8"?>
 <p:sld xmlns:a="http://schemas.openxmlformats.org/drawingml/2006/main" xmlns:r="http://schemas.openxmlformats.org/officeDocument/2006/relationships" xmlns:p="http://schemas.openxmlformats.org/presentationml/2006/main">
   <p:cSld>
@@ -8984,6 +9226,167 @@
 </file>
 
 <file path=ppt/slides/slide20.xml><?xml version="1.0" encoding="utf-8"?>
+<p:sld xmlns:a="http://schemas.openxmlformats.org/drawingml/2006/main" xmlns:r="http://schemas.openxmlformats.org/officeDocument/2006/relationships" xmlns:p="http://schemas.openxmlformats.org/presentationml/2006/main">
+  <p:cSld>
+    <p:spTree>
+      <p:nvGrpSpPr>
+        <p:cNvPr id="1" name=""/>
+        <p:cNvGrpSpPr/>
+        <p:nvPr/>
+      </p:nvGrpSpPr>
+      <p:grpSpPr>
+        <a:xfrm>
+          <a:off x="0" y="0"/>
+          <a:ext cx="0" cy="0"/>
+          <a:chOff x="0" y="0"/>
+          <a:chExt cx="0" cy="0"/>
+        </a:xfrm>
+      </p:grpSpPr>
+      <p:sp>
+        <p:nvSpPr>
+          <p:cNvPr id="2" name="Title 1">
+            <a:extLst>
+              <a:ext uri="{FF2B5EF4-FFF2-40B4-BE49-F238E27FC236}">
+                <a16:creationId xmlns:a16="http://schemas.microsoft.com/office/drawing/2014/main" id="{6B9BCD65-9DF0-9AC4-2778-EA108EA9A626}"/>
+              </a:ext>
+            </a:extLst>
+          </p:cNvPr>
+          <p:cNvSpPr>
+            <a:spLocks noGrp="1"/>
+          </p:cNvSpPr>
+          <p:nvPr>
+            <p:ph type="title"/>
+          </p:nvPr>
+        </p:nvSpPr>
+        <p:spPr/>
+        <p:txBody>
+          <a:bodyPr/>
+          <a:lstStyle/>
+          <a:p>
+            <a:pPr algn="ctr"/>
+            <a:r>
+              <a:rPr lang="en-US" dirty="0"/>
+              <a:t>SQL &amp; HAVING</a:t>
+            </a:r>
+          </a:p>
+        </p:txBody>
+      </p:sp>
+      <p:sp>
+        <p:nvSpPr>
+          <p:cNvPr id="3" name="Content Placeholder 2">
+            <a:extLst>
+              <a:ext uri="{FF2B5EF4-FFF2-40B4-BE49-F238E27FC236}">
+                <a16:creationId xmlns:a16="http://schemas.microsoft.com/office/drawing/2014/main" id="{A5C059B5-3E26-6BC6-C98E-3E10664CBA31}"/>
+              </a:ext>
+            </a:extLst>
+          </p:cNvPr>
+          <p:cNvSpPr>
+            <a:spLocks noGrp="1"/>
+          </p:cNvSpPr>
+          <p:nvPr>
+            <p:ph idx="1"/>
+          </p:nvPr>
+        </p:nvSpPr>
+        <p:spPr/>
+        <p:txBody>
+          <a:bodyPr/>
+          <a:lstStyle/>
+          <a:p>
+            <a:r>
+              <a:rPr lang="ru-RU" dirty="0"/>
+              <a:t>Представьте, что у вас есть таблица заказов с информацией о покупателях, товарах и суммах заказов. Вы хотите найти покупателей, которые потратили в сумме более 1000 рублей.</a:t>
+            </a:r>
+            <a:endParaRPr lang="en-US" dirty="0"/>
+          </a:p>
+          <a:p>
+            <a:endParaRPr lang="en-US" dirty="0"/>
+          </a:p>
+          <a:p>
+            <a:pPr marL="0" indent="0">
+              <a:buNone/>
+            </a:pPr>
+            <a:r>
+              <a:rPr lang="en-US" dirty="0"/>
+              <a:t>    SELECT    </a:t>
+            </a:r>
+            <a:r>
+              <a:rPr lang="en-US" dirty="0" err="1"/>
+              <a:t>customer_id</a:t>
+            </a:r>
+            <a:r>
+              <a:rPr lang="en-US" dirty="0"/>
+              <a:t>,    SUM(</a:t>
+            </a:r>
+            <a:r>
+              <a:rPr lang="en-US" dirty="0" err="1"/>
+              <a:t>order_amount</a:t>
+            </a:r>
+            <a:r>
+              <a:rPr lang="en-US" dirty="0"/>
+              <a:t>) AS </a:t>
+            </a:r>
+            <a:r>
+              <a:rPr lang="en-US" dirty="0" err="1"/>
+              <a:t>total_spent</a:t>
+            </a:r>
+            <a:endParaRPr lang="en-US" dirty="0"/>
+          </a:p>
+          <a:p>
+            <a:pPr marL="0" indent="0">
+              <a:buNone/>
+            </a:pPr>
+            <a:r>
+              <a:rPr lang="en-US" dirty="0"/>
+              <a:t>       FROM    orders</a:t>
+            </a:r>
+          </a:p>
+          <a:p>
+            <a:pPr marL="0" indent="0">
+              <a:buNone/>
+            </a:pPr>
+            <a:r>
+              <a:rPr lang="en-US" dirty="0"/>
+              <a:t>GROUP BY    </a:t>
+            </a:r>
+            <a:r>
+              <a:rPr lang="en-US" dirty="0" err="1"/>
+              <a:t>customer_id</a:t>
+            </a:r>
+            <a:endParaRPr lang="en-US" dirty="0"/>
+          </a:p>
+          <a:p>
+            <a:pPr marL="0" indent="0">
+              <a:buNone/>
+            </a:pPr>
+            <a:r>
+              <a:rPr lang="en-US" dirty="0"/>
+              <a:t>    HAVING    SUM(</a:t>
+            </a:r>
+            <a:r>
+              <a:rPr lang="en-US" dirty="0" err="1"/>
+              <a:t>order_amount</a:t>
+            </a:r>
+            <a:r>
+              <a:rPr lang="en-US" dirty="0"/>
+              <a:t>) &gt; 1000;</a:t>
+            </a:r>
+          </a:p>
+        </p:txBody>
+      </p:sp>
+    </p:spTree>
+    <p:extLst>
+      <p:ext uri="{BB962C8B-B14F-4D97-AF65-F5344CB8AC3E}">
+        <p14:creationId xmlns:p14="http://schemas.microsoft.com/office/powerpoint/2010/main" val="2678335996"/>
+      </p:ext>
+    </p:extLst>
+  </p:cSld>
+  <p:clrMapOvr>
+    <a:masterClrMapping/>
+  </p:clrMapOvr>
+</p:sld>
+</file>
+
+<file path=ppt/slides/slide21.xml><?xml version="1.0" encoding="utf-8"?>
 <p:sld xmlns:a="http://schemas.openxmlformats.org/drawingml/2006/main" xmlns:r="http://schemas.openxmlformats.org/officeDocument/2006/relationships" xmlns:p="http://schemas.openxmlformats.org/presentationml/2006/main">
   <p:cSld>
     <p:spTree>
@@ -9078,139 +9481,6 @@
 </p:sld>
 </file>
 
-<file path=ppt/slides/slide21.xml><?xml version="1.0" encoding="utf-8"?>
-<p:sld xmlns:a="http://schemas.openxmlformats.org/drawingml/2006/main" xmlns:r="http://schemas.openxmlformats.org/officeDocument/2006/relationships" xmlns:p="http://schemas.openxmlformats.org/presentationml/2006/main">
-  <p:cSld>
-    <p:spTree>
-      <p:nvGrpSpPr>
-        <p:cNvPr id="1" name=""/>
-        <p:cNvGrpSpPr/>
-        <p:nvPr/>
-      </p:nvGrpSpPr>
-      <p:grpSpPr>
-        <a:xfrm>
-          <a:off x="0" y="0"/>
-          <a:ext cx="0" cy="0"/>
-          <a:chOff x="0" y="0"/>
-          <a:chExt cx="0" cy="0"/>
-        </a:xfrm>
-      </p:grpSpPr>
-      <p:sp>
-        <p:nvSpPr>
-          <p:cNvPr id="2" name="Title 1">
-            <a:extLst>
-              <a:ext uri="{FF2B5EF4-FFF2-40B4-BE49-F238E27FC236}">
-                <a16:creationId xmlns:a16="http://schemas.microsoft.com/office/drawing/2014/main" id="{87FD5557-E4A0-4814-2F12-3CDBD77D2581}"/>
-              </a:ext>
-            </a:extLst>
-          </p:cNvPr>
-          <p:cNvSpPr>
-            <a:spLocks noGrp="1"/>
-          </p:cNvSpPr>
-          <p:nvPr>
-            <p:ph type="title"/>
-          </p:nvPr>
-        </p:nvSpPr>
-        <p:spPr/>
-        <p:txBody>
-          <a:bodyPr/>
-          <a:lstStyle/>
-          <a:p>
-            <a:pPr algn="ctr"/>
-            <a:r>
-              <a:rPr lang="ru-RU" dirty="0"/>
-              <a:t>Как создать бин в </a:t>
-            </a:r>
-            <a:r>
-              <a:rPr lang="en-US" dirty="0"/>
-              <a:t>Spring</a:t>
-            </a:r>
-          </a:p>
-        </p:txBody>
-      </p:sp>
-      <p:sp>
-        <p:nvSpPr>
-          <p:cNvPr id="3" name="Content Placeholder 2">
-            <a:extLst>
-              <a:ext uri="{FF2B5EF4-FFF2-40B4-BE49-F238E27FC236}">
-                <a16:creationId xmlns:a16="http://schemas.microsoft.com/office/drawing/2014/main" id="{D639DC7D-5B23-C9EC-BC31-A8F52F26F144}"/>
-              </a:ext>
-            </a:extLst>
-          </p:cNvPr>
-          <p:cNvSpPr>
-            <a:spLocks noGrp="1"/>
-          </p:cNvSpPr>
-          <p:nvPr>
-            <p:ph idx="1"/>
-          </p:nvPr>
-        </p:nvSpPr>
-        <p:spPr/>
-        <p:txBody>
-          <a:bodyPr>
-            <a:noAutofit/>
-          </a:bodyPr>
-          <a:lstStyle/>
-          <a:p>
-            <a:r>
-              <a:rPr lang="ru-RU" sz="2400" dirty="0"/>
-              <a:t>С использованием аннотации @Bean в классе конфигурации:</a:t>
-            </a:r>
-          </a:p>
-          <a:p>
-            <a:pPr marL="0" indent="0">
-              <a:buNone/>
-            </a:pPr>
-            <a:r>
-              <a:rPr lang="ru-RU" sz="2400" dirty="0"/>
-              <a:t>Создайте класс, который будет содержать конфигурацию </a:t>
-            </a:r>
-            <a:r>
-              <a:rPr lang="ru-RU" sz="2400" dirty="0" err="1"/>
-              <a:t>бинов</a:t>
-            </a:r>
-            <a:r>
-              <a:rPr lang="ru-RU" sz="2400" dirty="0"/>
-              <a:t>, и аннотируйте его @Configuration.</a:t>
-            </a:r>
-            <a:endParaRPr lang="en-US" sz="2400" dirty="0"/>
-          </a:p>
-          <a:p>
-            <a:pPr marL="0" indent="0">
-              <a:buNone/>
-            </a:pPr>
-            <a:endParaRPr lang="en-US" sz="2400" dirty="0"/>
-          </a:p>
-          <a:p>
-            <a:r>
-              <a:rPr lang="ru-RU" sz="2400" dirty="0"/>
-              <a:t>С использованием аннотаций компонентов:</a:t>
-            </a:r>
-          </a:p>
-          <a:p>
-            <a:pPr marL="0" indent="0">
-              <a:buNone/>
-            </a:pPr>
-            <a:r>
-              <a:rPr lang="ru-RU" sz="2400" dirty="0"/>
-              <a:t>Аннотируйте класс, который вы хотите сделать бином, соответствующей стереотипной аннотацией: @Component (для обычных компонентов), @Repository (для репозиториев), @Service (для сервисов), @RestController (для контроллеров).</a:t>
-            </a:r>
-            <a:endParaRPr lang="en-US" sz="2400" dirty="0"/>
-          </a:p>
-        </p:txBody>
-      </p:sp>
-    </p:spTree>
-    <p:extLst>
-      <p:ext uri="{BB962C8B-B14F-4D97-AF65-F5344CB8AC3E}">
-        <p14:creationId xmlns:p14="http://schemas.microsoft.com/office/powerpoint/2010/main" val="417890304"/>
-      </p:ext>
-    </p:extLst>
-  </p:cSld>
-  <p:clrMapOvr>
-    <a:masterClrMapping/>
-  </p:clrMapOvr>
-</p:sld>
-</file>
-
 <file path=ppt/slides/slide22.xml><?xml version="1.0" encoding="utf-8"?>
 <p:sld xmlns:a="http://schemas.openxmlformats.org/drawingml/2006/main" xmlns:r="http://schemas.openxmlformats.org/officeDocument/2006/relationships" xmlns:p="http://schemas.openxmlformats.org/presentationml/2006/main">
   <p:cSld>
@@ -9233,7 +9503,7 @@
           <p:cNvPr id="2" name="Title 1">
             <a:extLst>
               <a:ext uri="{FF2B5EF4-FFF2-40B4-BE49-F238E27FC236}">
-                <a16:creationId xmlns:a16="http://schemas.microsoft.com/office/drawing/2014/main" id="{896A1F33-F3A9-A49A-4F35-E139B7D969A1}"/>
+                <a16:creationId xmlns:a16="http://schemas.microsoft.com/office/drawing/2014/main" id="{87FD5557-E4A0-4814-2F12-3CDBD77D2581}"/>
               </a:ext>
             </a:extLst>
           </p:cNvPr>
@@ -9252,19 +9522,11 @@
             <a:pPr algn="ctr"/>
             <a:r>
               <a:rPr lang="ru-RU" dirty="0"/>
-              <a:t>Основные скопы </a:t>
-            </a:r>
-            <a:r>
-              <a:rPr lang="ru-RU" dirty="0" err="1"/>
-              <a:t>бинов</a:t>
-            </a:r>
-            <a:r>
-              <a:rPr lang="ru-RU" dirty="0"/>
-              <a:t> в Spring</a:t>
+              <a:t>Как создать бин в </a:t>
             </a:r>
             <a:r>
               <a:rPr lang="en-US" dirty="0"/>
-              <a:t> </a:t>
+              <a:t>Spring</a:t>
             </a:r>
           </a:p>
         </p:txBody>
@@ -9274,7 +9536,7 @@
           <p:cNvPr id="3" name="Content Placeholder 2">
             <a:extLst>
               <a:ext uri="{FF2B5EF4-FFF2-40B4-BE49-F238E27FC236}">
-                <a16:creationId xmlns:a16="http://schemas.microsoft.com/office/drawing/2014/main" id="{88CBE0D8-97CB-8F11-8DC5-42AF2C6819A9}"/>
+                <a16:creationId xmlns:a16="http://schemas.microsoft.com/office/drawing/2014/main" id="{D639DC7D-5B23-C9EC-BC31-A8F52F26F144}"/>
               </a:ext>
             </a:extLst>
           </p:cNvPr>
@@ -9285,12 +9547,7 @@
             <p:ph idx="1"/>
           </p:nvPr>
         </p:nvSpPr>
-        <p:spPr>
-          <a:xfrm>
-            <a:off x="452761" y="2130641"/>
-            <a:ext cx="8821241" cy="3910721"/>
-          </a:xfrm>
-        </p:spPr>
+        <p:spPr/>
         <p:txBody>
           <a:bodyPr>
             <a:noAutofit/>
@@ -9298,130 +9555,56 @@
           <a:lstStyle/>
           <a:p>
             <a:r>
-              <a:rPr lang="ru-RU" sz="1600" dirty="0" err="1"/>
-              <a:t>Singleton</a:t>
-            </a:r>
-            <a:r>
-              <a:rPr lang="ru-RU" sz="1600" dirty="0"/>
-              <a:t> (</a:t>
-            </a:r>
-            <a:r>
-              <a:rPr lang="ru-RU" sz="1600" dirty="0" err="1"/>
-              <a:t>синглтон</a:t>
-            </a:r>
-            <a:r>
-              <a:rPr lang="ru-RU" sz="1600" dirty="0"/>
-              <a:t>): Это область видимости по умолчанию. Создается только один экземпляр </a:t>
-            </a:r>
-            <a:r>
-              <a:rPr lang="ru-RU" sz="1600" dirty="0" err="1"/>
-              <a:t>бина</a:t>
-            </a:r>
-            <a:r>
-              <a:rPr lang="ru-RU" sz="1600" dirty="0"/>
-              <a:t> на весь контейнер Spring </a:t>
-            </a:r>
-            <a:r>
-              <a:rPr lang="ru-RU" sz="1600" dirty="0" err="1"/>
-              <a:t>IoC</a:t>
-            </a:r>
-            <a:r>
-              <a:rPr lang="ru-RU" sz="1600" dirty="0"/>
-              <a:t>, и все последующие запросы возвращают этот же экземпляр.</a:t>
-            </a:r>
-          </a:p>
-          <a:p>
-            <a:r>
-              <a:rPr lang="ru-RU" sz="1600" dirty="0" err="1"/>
-              <a:t>Prototype</a:t>
-            </a:r>
-            <a:r>
-              <a:rPr lang="ru-RU" sz="1600" dirty="0"/>
-              <a:t> (прототип): Каждый раз при запросе </a:t>
-            </a:r>
-            <a:r>
-              <a:rPr lang="ru-RU" sz="1600" dirty="0" err="1"/>
-              <a:t>бина</a:t>
-            </a:r>
-            <a:r>
-              <a:rPr lang="ru-RU" sz="1600" dirty="0"/>
-              <a:t> из контейнера создается новый экземпляр. Это полезно, когда нужны независимые экземпляры объекта.</a:t>
-            </a:r>
-          </a:p>
-          <a:p>
-            <a:r>
-              <a:rPr lang="ru-RU" sz="1600" dirty="0" err="1"/>
-              <a:t>Request</a:t>
-            </a:r>
-            <a:r>
-              <a:rPr lang="ru-RU" sz="1600" dirty="0"/>
-              <a:t> (запрос): Применяется в веб-приложениях. Создается один экземпляр </a:t>
-            </a:r>
-            <a:r>
-              <a:rPr lang="ru-RU" sz="1600" dirty="0" err="1"/>
-              <a:t>бина</a:t>
-            </a:r>
-            <a:r>
-              <a:rPr lang="ru-RU" sz="1600" dirty="0"/>
-              <a:t> на каждый HTTP-запрос. Бин живёт в пределах одного запроса.</a:t>
-            </a:r>
-          </a:p>
-          <a:p>
-            <a:r>
-              <a:rPr lang="ru-RU" sz="1600" dirty="0" err="1"/>
-              <a:t>Session</a:t>
-            </a:r>
-            <a:r>
-              <a:rPr lang="ru-RU" sz="1600" dirty="0"/>
-              <a:t> (сессия): Также используется в веб-приложениях. Бин создается на время жизни HTTP-сессии пользователя и уничтожается вместе с завершением сессии.</a:t>
-            </a:r>
-          </a:p>
-          <a:p>
-            <a:r>
-              <a:rPr lang="ru-RU" sz="1600" dirty="0"/>
-              <a:t>Application (приложение): Создается один экземпляр </a:t>
-            </a:r>
-            <a:r>
-              <a:rPr lang="ru-RU" sz="1600" dirty="0" err="1"/>
-              <a:t>бина</a:t>
-            </a:r>
-            <a:r>
-              <a:rPr lang="ru-RU" sz="1600" dirty="0"/>
-              <a:t> на все время жизни </a:t>
-            </a:r>
-            <a:r>
-              <a:rPr lang="ru-RU" sz="1600" dirty="0" err="1"/>
-              <a:t>ServletContext</a:t>
-            </a:r>
-            <a:r>
-              <a:rPr lang="ru-RU" sz="1600" dirty="0"/>
-              <a:t>, что означает, что он доступен во всем веб-приложении, а не только в рамках одного запроса или сессии.</a:t>
-            </a:r>
-          </a:p>
-          <a:p>
-            <a:r>
-              <a:rPr lang="ru-RU" sz="1600" dirty="0" err="1"/>
-              <a:t>WebSocket</a:t>
-            </a:r>
-            <a:r>
-              <a:rPr lang="ru-RU" sz="1600" dirty="0"/>
-              <a:t> (веб-сокет): Бин создается для каждой сессии </a:t>
-            </a:r>
-            <a:r>
-              <a:rPr lang="ru-RU" sz="1600" dirty="0" err="1"/>
-              <a:t>WebSocket</a:t>
-            </a:r>
-            <a:r>
-              <a:rPr lang="ru-RU" sz="1600" dirty="0"/>
-              <a:t> и управляется жизненным циклом этой сессии. </a:t>
-            </a:r>
+              <a:rPr lang="ru-RU" sz="2400" dirty="0"/>
+              <a:t>С использованием аннотации @Bean в классе конфигурации:</a:t>
+            </a:r>
+          </a:p>
+          <a:p>
+            <a:pPr marL="0" indent="0">
+              <a:buNone/>
+            </a:pPr>
+            <a:r>
+              <a:rPr lang="ru-RU" sz="2400" dirty="0"/>
+              <a:t>Создайте класс, который будет содержать конфигурацию </a:t>
+            </a:r>
+            <a:r>
+              <a:rPr lang="ru-RU" sz="2400" dirty="0" err="1"/>
+              <a:t>бинов</a:t>
+            </a:r>
+            <a:r>
+              <a:rPr lang="ru-RU" sz="2400" dirty="0"/>
+              <a:t>, и аннотируйте его @Configuration.</a:t>
+            </a:r>
+            <a:endParaRPr lang="en-US" sz="2400" dirty="0"/>
+          </a:p>
+          <a:p>
+            <a:pPr marL="0" indent="0">
+              <a:buNone/>
+            </a:pPr>
+            <a:endParaRPr lang="en-US" sz="2400" dirty="0"/>
+          </a:p>
+          <a:p>
+            <a:r>
+              <a:rPr lang="ru-RU" sz="2400" dirty="0"/>
+              <a:t>С использованием аннотаций компонентов:</a:t>
+            </a:r>
+          </a:p>
+          <a:p>
+            <a:pPr marL="0" indent="0">
+              <a:buNone/>
+            </a:pPr>
+            <a:r>
+              <a:rPr lang="ru-RU" sz="2400" dirty="0"/>
+              <a:t>Аннотируйте класс, который вы хотите сделать бином, соответствующей стереотипной аннотацией: @Component (для обычных компонентов), @Repository (для репозиториев), @Service (для сервисов), @RestController (для контроллеров).</a:t>
+            </a:r>
+            <a:endParaRPr lang="en-US" sz="2400" dirty="0"/>
           </a:p>
         </p:txBody>
       </p:sp>
     </p:spTree>
     <p:extLst>
       <p:ext uri="{BB962C8B-B14F-4D97-AF65-F5344CB8AC3E}">
-        <p14:creationId xmlns:p14="http://schemas.microsoft.com/office/powerpoint/2010/main" val="3117695600"/>
+        <p14:creationId xmlns:p14="http://schemas.microsoft.com/office/powerpoint/2010/main" val="417890304"/>
       </p:ext>
     </p:extLst>
   </p:cSld>
@@ -9453,7 +9636,7 @@
           <p:cNvPr id="2" name="Title 1">
             <a:extLst>
               <a:ext uri="{FF2B5EF4-FFF2-40B4-BE49-F238E27FC236}">
-                <a16:creationId xmlns:a16="http://schemas.microsoft.com/office/drawing/2014/main" id="{66DD8E22-E29F-FCF5-FE0F-61A7BAF49930}"/>
+                <a16:creationId xmlns:a16="http://schemas.microsoft.com/office/drawing/2014/main" id="{896A1F33-F3A9-A49A-4F35-E139B7D969A1}"/>
               </a:ext>
             </a:extLst>
           </p:cNvPr>
@@ -9472,9 +9655,20 @@
             <a:pPr algn="ctr"/>
             <a:r>
               <a:rPr lang="ru-RU" dirty="0"/>
-              <a:t>Паттерны проектирования </a:t>
-            </a:r>
-            <a:endParaRPr lang="en-US" dirty="0"/>
+              <a:t>Основные скопы </a:t>
+            </a:r>
+            <a:r>
+              <a:rPr lang="ru-RU" dirty="0" err="1"/>
+              <a:t>бинов</a:t>
+            </a:r>
+            <a:r>
+              <a:rPr lang="ru-RU" dirty="0"/>
+              <a:t> в Spring</a:t>
+            </a:r>
+            <a:r>
+              <a:rPr lang="en-US" dirty="0"/>
+              <a:t> </a:t>
+            </a:r>
           </a:p>
         </p:txBody>
       </p:sp>
@@ -9483,7 +9677,7 @@
           <p:cNvPr id="3" name="Content Placeholder 2">
             <a:extLst>
               <a:ext uri="{FF2B5EF4-FFF2-40B4-BE49-F238E27FC236}">
-                <a16:creationId xmlns:a16="http://schemas.microsoft.com/office/drawing/2014/main" id="{0812488F-5182-DA2E-2A64-7325F8A75017}"/>
+                <a16:creationId xmlns:a16="http://schemas.microsoft.com/office/drawing/2014/main" id="{88CBE0D8-97CB-8F11-8DC5-42AF2C6819A9}"/>
               </a:ext>
             </a:extLst>
           </p:cNvPr>
@@ -9494,93 +9688,143 @@
             <p:ph idx="1"/>
           </p:nvPr>
         </p:nvSpPr>
-        <p:spPr/>
+        <p:spPr>
+          <a:xfrm>
+            <a:off x="452761" y="2130641"/>
+            <a:ext cx="8821241" cy="3910721"/>
+          </a:xfrm>
+        </p:spPr>
         <p:txBody>
           <a:bodyPr>
-            <a:normAutofit fontScale="92500"/>
+            <a:noAutofit/>
           </a:bodyPr>
           <a:lstStyle/>
           <a:p>
             <a:r>
-              <a:rPr lang="ru-RU" dirty="0" err="1"/>
+              <a:rPr lang="ru-RU" sz="1600" dirty="0" err="1"/>
               <a:t>Singleton</a:t>
             </a:r>
             <a:r>
-              <a:rPr lang="ru-RU" dirty="0"/>
-              <a:t> - порождающий шаблон проектирования, гарантирующий, что в </a:t>
-            </a:r>
-            <a:r>
-              <a:rPr lang="ru-RU" dirty="0" err="1"/>
-              <a:t>однопроцессном</a:t>
-            </a:r>
-            <a:r>
-              <a:rPr lang="ru-RU" dirty="0"/>
-              <a:t> приложении будет единственный экземпляр некоторого класса, и предоставляющий глобальную точку доступа к этому экземпляр;</a:t>
-            </a:r>
-          </a:p>
-          <a:p>
-            <a:r>
-              <a:rPr lang="ru-RU" dirty="0"/>
-              <a:t>Factory </a:t>
-            </a:r>
-            <a:r>
-              <a:rPr lang="ru-RU" dirty="0" err="1"/>
-              <a:t>Method</a:t>
-            </a:r>
-            <a:r>
-              <a:rPr lang="ru-RU" dirty="0"/>
-              <a:t> - делегируем процесс создания объектов классам-наследникам;</a:t>
-            </a:r>
-          </a:p>
-          <a:p>
-            <a:r>
-              <a:rPr lang="ru-RU" dirty="0" err="1"/>
+              <a:rPr lang="ru-RU" sz="1600" dirty="0"/>
+              <a:t> (</a:t>
+            </a:r>
+            <a:r>
+              <a:rPr lang="ru-RU" sz="1600" dirty="0" err="1"/>
+              <a:t>синглтон</a:t>
+            </a:r>
+            <a:r>
+              <a:rPr lang="ru-RU" sz="1600" dirty="0"/>
+              <a:t>): Это область видимости по умолчанию. Создается только один экземпляр </a:t>
+            </a:r>
+            <a:r>
+              <a:rPr lang="ru-RU" sz="1600" dirty="0" err="1"/>
+              <a:t>бина</a:t>
+            </a:r>
+            <a:r>
+              <a:rPr lang="ru-RU" sz="1600" dirty="0"/>
+              <a:t> на весь контейнер Spring </a:t>
+            </a:r>
+            <a:r>
+              <a:rPr lang="ru-RU" sz="1600" dirty="0" err="1"/>
+              <a:t>IoC</a:t>
+            </a:r>
+            <a:r>
+              <a:rPr lang="ru-RU" sz="1600" dirty="0"/>
+              <a:t>, и все последующие запросы возвращают этот же экземпляр.</a:t>
+            </a:r>
+          </a:p>
+          <a:p>
+            <a:r>
+              <a:rPr lang="ru-RU" sz="1600" dirty="0" err="1"/>
               <a:t>Prototype</a:t>
             </a:r>
             <a:r>
-              <a:rPr lang="ru-RU" dirty="0"/>
-              <a:t> - клонируем объекты на основании некоторого базового объекта;</a:t>
-            </a:r>
-          </a:p>
-          <a:p>
-            <a:r>
-              <a:rPr lang="ru-RU" dirty="0" err="1"/>
-              <a:t>Builder</a:t>
-            </a:r>
-            <a:r>
-              <a:rPr lang="ru-RU" dirty="0"/>
-              <a:t> - отделяем процесс создания комплексного объекта от его представления;</a:t>
-            </a:r>
-          </a:p>
-          <a:p>
-            <a:r>
-              <a:rPr lang="ru-RU" dirty="0" err="1"/>
-              <a:t>Abstract</a:t>
-            </a:r>
-            <a:r>
-              <a:rPr lang="ru-RU" dirty="0"/>
-              <a:t> Factory - описываем сущность для создания целых семейств взаимосвязанных объектов;</a:t>
-            </a:r>
-          </a:p>
-          <a:p>
-            <a:r>
-              <a:rPr lang="ru-RU" dirty="0" err="1"/>
-              <a:t>Facade</a:t>
-            </a:r>
-            <a:r>
-              <a:rPr lang="ru-RU" dirty="0"/>
-              <a:t> - описываем унифицированный интерфейс для облегчения работы с набором подсистем;</a:t>
-            </a:r>
-          </a:p>
-          <a:p>
-            <a:endParaRPr lang="en-US" dirty="0"/>
+              <a:rPr lang="ru-RU" sz="1600" dirty="0"/>
+              <a:t> (прототип): Каждый раз при запросе </a:t>
+            </a:r>
+            <a:r>
+              <a:rPr lang="ru-RU" sz="1600" dirty="0" err="1"/>
+              <a:t>бина</a:t>
+            </a:r>
+            <a:r>
+              <a:rPr lang="ru-RU" sz="1600" dirty="0"/>
+              <a:t> из контейнера создается новый экземпляр. Это полезно, когда нужны независимые экземпляры объекта.</a:t>
+            </a:r>
+          </a:p>
+          <a:p>
+            <a:r>
+              <a:rPr lang="ru-RU" sz="1600" dirty="0" err="1"/>
+              <a:t>Request</a:t>
+            </a:r>
+            <a:r>
+              <a:rPr lang="ru-RU" sz="1600" dirty="0"/>
+              <a:t> (запрос): Применяется в веб-приложениях. Создается один экземпляр </a:t>
+            </a:r>
+            <a:r>
+              <a:rPr lang="ru-RU" sz="1600" dirty="0" err="1"/>
+              <a:t>бина</a:t>
+            </a:r>
+            <a:r>
+              <a:rPr lang="ru-RU" sz="1600" dirty="0"/>
+              <a:t> на каждый HTTP-запрос. Бин живёт в пределах одного запроса.</a:t>
+            </a:r>
+          </a:p>
+          <a:p>
+            <a:r>
+              <a:rPr lang="ru-RU" sz="1600" dirty="0" err="1"/>
+              <a:t>Session</a:t>
+            </a:r>
+            <a:r>
+              <a:rPr lang="ru-RU" sz="1600" dirty="0"/>
+              <a:t> (сессия): Также используется в веб-приложениях. Бин создается на время жизни HTTP-сессии пользователя и уничтожается вместе с завершением сессии.</a:t>
+            </a:r>
+          </a:p>
+          <a:p>
+            <a:r>
+              <a:rPr lang="ru-RU" sz="1600" dirty="0"/>
+              <a:t>Application (приложение): Создается один экземпляр </a:t>
+            </a:r>
+            <a:r>
+              <a:rPr lang="ru-RU" sz="1600" dirty="0" err="1"/>
+              <a:t>бина</a:t>
+            </a:r>
+            <a:r>
+              <a:rPr lang="ru-RU" sz="1600" dirty="0"/>
+              <a:t> на все время жизни </a:t>
+            </a:r>
+            <a:r>
+              <a:rPr lang="ru-RU" sz="1600" dirty="0" err="1"/>
+              <a:t>ServletContext</a:t>
+            </a:r>
+            <a:r>
+              <a:rPr lang="ru-RU" sz="1600" dirty="0"/>
+              <a:t>, что означает, что он доступен во всем веб-приложении, а не только в рамках одного запроса или сессии.</a:t>
+            </a:r>
+          </a:p>
+          <a:p>
+            <a:r>
+              <a:rPr lang="ru-RU" sz="1600" dirty="0" err="1"/>
+              <a:t>WebSocket</a:t>
+            </a:r>
+            <a:r>
+              <a:rPr lang="ru-RU" sz="1600" dirty="0"/>
+              <a:t> (веб-сокет): Бин создается для каждой сессии </a:t>
+            </a:r>
+            <a:r>
+              <a:rPr lang="ru-RU" sz="1600" dirty="0" err="1"/>
+              <a:t>WebSocket</a:t>
+            </a:r>
+            <a:r>
+              <a:rPr lang="ru-RU" sz="1600" dirty="0"/>
+              <a:t> и управляется жизненным циклом этой сессии. </a:t>
+            </a:r>
           </a:p>
         </p:txBody>
       </p:sp>
     </p:spTree>
     <p:extLst>
       <p:ext uri="{BB962C8B-B14F-4D97-AF65-F5344CB8AC3E}">
-        <p14:creationId xmlns:p14="http://schemas.microsoft.com/office/powerpoint/2010/main" val="1965490351"/>
+        <p14:creationId xmlns:p14="http://schemas.microsoft.com/office/powerpoint/2010/main" val="3117695600"/>
       </p:ext>
     </p:extLst>
   </p:cSld>
@@ -9612,6 +9856,165 @@
           <p:cNvPr id="2" name="Title 1">
             <a:extLst>
               <a:ext uri="{FF2B5EF4-FFF2-40B4-BE49-F238E27FC236}">
+                <a16:creationId xmlns:a16="http://schemas.microsoft.com/office/drawing/2014/main" id="{66DD8E22-E29F-FCF5-FE0F-61A7BAF49930}"/>
+              </a:ext>
+            </a:extLst>
+          </p:cNvPr>
+          <p:cNvSpPr>
+            <a:spLocks noGrp="1"/>
+          </p:cNvSpPr>
+          <p:nvPr>
+            <p:ph type="title"/>
+          </p:nvPr>
+        </p:nvSpPr>
+        <p:spPr/>
+        <p:txBody>
+          <a:bodyPr/>
+          <a:lstStyle/>
+          <a:p>
+            <a:pPr algn="ctr"/>
+            <a:r>
+              <a:rPr lang="ru-RU" dirty="0"/>
+              <a:t>Паттерны проектирования </a:t>
+            </a:r>
+            <a:endParaRPr lang="en-US" dirty="0"/>
+          </a:p>
+        </p:txBody>
+      </p:sp>
+      <p:sp>
+        <p:nvSpPr>
+          <p:cNvPr id="3" name="Content Placeholder 2">
+            <a:extLst>
+              <a:ext uri="{FF2B5EF4-FFF2-40B4-BE49-F238E27FC236}">
+                <a16:creationId xmlns:a16="http://schemas.microsoft.com/office/drawing/2014/main" id="{0812488F-5182-DA2E-2A64-7325F8A75017}"/>
+              </a:ext>
+            </a:extLst>
+          </p:cNvPr>
+          <p:cNvSpPr>
+            <a:spLocks noGrp="1"/>
+          </p:cNvSpPr>
+          <p:nvPr>
+            <p:ph idx="1"/>
+          </p:nvPr>
+        </p:nvSpPr>
+        <p:spPr/>
+        <p:txBody>
+          <a:bodyPr>
+            <a:normAutofit fontScale="92500"/>
+          </a:bodyPr>
+          <a:lstStyle/>
+          <a:p>
+            <a:r>
+              <a:rPr lang="ru-RU" dirty="0" err="1"/>
+              <a:t>Singleton</a:t>
+            </a:r>
+            <a:r>
+              <a:rPr lang="ru-RU" dirty="0"/>
+              <a:t> - порождающий шаблон проектирования, гарантирующий, что в </a:t>
+            </a:r>
+            <a:r>
+              <a:rPr lang="ru-RU" dirty="0" err="1"/>
+              <a:t>однопроцессном</a:t>
+            </a:r>
+            <a:r>
+              <a:rPr lang="ru-RU" dirty="0"/>
+              <a:t> приложении будет единственный экземпляр некоторого класса, и предоставляющий глобальную точку доступа к этому экземпляр;</a:t>
+            </a:r>
+          </a:p>
+          <a:p>
+            <a:r>
+              <a:rPr lang="ru-RU" dirty="0"/>
+              <a:t>Factory </a:t>
+            </a:r>
+            <a:r>
+              <a:rPr lang="ru-RU" dirty="0" err="1"/>
+              <a:t>Method</a:t>
+            </a:r>
+            <a:r>
+              <a:rPr lang="ru-RU" dirty="0"/>
+              <a:t> - делегируем процесс создания объектов классам-наследникам;</a:t>
+            </a:r>
+          </a:p>
+          <a:p>
+            <a:r>
+              <a:rPr lang="ru-RU" dirty="0" err="1"/>
+              <a:t>Prototype</a:t>
+            </a:r>
+            <a:r>
+              <a:rPr lang="ru-RU" dirty="0"/>
+              <a:t> - клонируем объекты на основании некоторого базового объекта;</a:t>
+            </a:r>
+          </a:p>
+          <a:p>
+            <a:r>
+              <a:rPr lang="ru-RU" dirty="0" err="1"/>
+              <a:t>Builder</a:t>
+            </a:r>
+            <a:r>
+              <a:rPr lang="ru-RU" dirty="0"/>
+              <a:t> - отделяем процесс создания комплексного объекта от его представления;</a:t>
+            </a:r>
+          </a:p>
+          <a:p>
+            <a:r>
+              <a:rPr lang="ru-RU" dirty="0" err="1"/>
+              <a:t>Abstract</a:t>
+            </a:r>
+            <a:r>
+              <a:rPr lang="ru-RU" dirty="0"/>
+              <a:t> Factory - описываем сущность для создания целых семейств взаимосвязанных объектов;</a:t>
+            </a:r>
+          </a:p>
+          <a:p>
+            <a:r>
+              <a:rPr lang="ru-RU" dirty="0" err="1"/>
+              <a:t>Facade</a:t>
+            </a:r>
+            <a:r>
+              <a:rPr lang="ru-RU" dirty="0"/>
+              <a:t> - описываем унифицированный интерфейс для облегчения работы с набором подсистем;</a:t>
+            </a:r>
+          </a:p>
+          <a:p>
+            <a:endParaRPr lang="en-US" dirty="0"/>
+          </a:p>
+        </p:txBody>
+      </p:sp>
+    </p:spTree>
+    <p:extLst>
+      <p:ext uri="{BB962C8B-B14F-4D97-AF65-F5344CB8AC3E}">
+        <p14:creationId xmlns:p14="http://schemas.microsoft.com/office/powerpoint/2010/main" val="1965490351"/>
+      </p:ext>
+    </p:extLst>
+  </p:cSld>
+  <p:clrMapOvr>
+    <a:masterClrMapping/>
+  </p:clrMapOvr>
+</p:sld>
+</file>
+
+<file path=ppt/slides/slide25.xml><?xml version="1.0" encoding="utf-8"?>
+<p:sld xmlns:a="http://schemas.openxmlformats.org/drawingml/2006/main" xmlns:r="http://schemas.openxmlformats.org/officeDocument/2006/relationships" xmlns:p="http://schemas.openxmlformats.org/presentationml/2006/main">
+  <p:cSld>
+    <p:spTree>
+      <p:nvGrpSpPr>
+        <p:cNvPr id="1" name=""/>
+        <p:cNvGrpSpPr/>
+        <p:nvPr/>
+      </p:nvGrpSpPr>
+      <p:grpSpPr>
+        <a:xfrm>
+          <a:off x="0" y="0"/>
+          <a:ext cx="0" cy="0"/>
+          <a:chOff x="0" y="0"/>
+          <a:chExt cx="0" cy="0"/>
+        </a:xfrm>
+      </p:grpSpPr>
+      <p:sp>
+        <p:nvSpPr>
+          <p:cNvPr id="2" name="Title 1">
+            <a:extLst>
+              <a:ext uri="{FF2B5EF4-FFF2-40B4-BE49-F238E27FC236}">
                 <a16:creationId xmlns:a16="http://schemas.microsoft.com/office/drawing/2014/main" id="{77D1AC13-A3C8-C2B6-9013-F7D47023D939}"/>
               </a:ext>
             </a:extLst>
@@ -9781,7 +10184,7 @@
 </p:sld>
 </file>
 
-<file path=ppt/slides/slide25.xml><?xml version="1.0" encoding="utf-8"?>
+<file path=ppt/slides/slide26.xml><?xml version="1.0" encoding="utf-8"?>
 <p:sld xmlns:a="http://schemas.openxmlformats.org/drawingml/2006/main" xmlns:r="http://schemas.openxmlformats.org/officeDocument/2006/relationships" xmlns:p="http://schemas.openxmlformats.org/presentationml/2006/main">
   <p:cSld>
     <p:spTree>
@@ -9973,7 +10376,7 @@
 </p:sld>
 </file>
 
-<file path=ppt/slides/slide26.xml><?xml version="1.0" encoding="utf-8"?>
+<file path=ppt/slides/slide27.xml><?xml version="1.0" encoding="utf-8"?>
 <p:sld xmlns:a="http://schemas.openxmlformats.org/drawingml/2006/main" xmlns:r="http://schemas.openxmlformats.org/officeDocument/2006/relationships" xmlns:p="http://schemas.openxmlformats.org/presentationml/2006/main">
   <p:cSld>
     <p:spTree>
@@ -10163,7 +10566,7 @@
 </p:sld>
 </file>
 
-<file path=ppt/slides/slide27.xml><?xml version="1.0" encoding="utf-8"?>
+<file path=ppt/slides/slide28.xml><?xml version="1.0" encoding="utf-8"?>
 <p:sld xmlns:a="http://schemas.openxmlformats.org/drawingml/2006/main" xmlns:r="http://schemas.openxmlformats.org/officeDocument/2006/relationships" xmlns:p="http://schemas.openxmlformats.org/presentationml/2006/main">
   <p:cSld>
     <p:spTree>
@@ -10333,7 +10736,7 @@
 </p:sld>
 </file>
 
-<file path=ppt/slides/slide28.xml><?xml version="1.0" encoding="utf-8"?>
+<file path=ppt/slides/slide29.xml><?xml version="1.0" encoding="utf-8"?>
 <p:sld xmlns:a="http://schemas.openxmlformats.org/drawingml/2006/main" xmlns:r="http://schemas.openxmlformats.org/officeDocument/2006/relationships" xmlns:p="http://schemas.openxmlformats.org/presentationml/2006/main">
   <p:cSld>
     <p:spTree>
@@ -10506,7 +10909,254 @@
 </p:sld>
 </file>
 
-<file path=ppt/slides/slide29.xml><?xml version="1.0" encoding="utf-8"?>
+<file path=ppt/slides/slide3.xml><?xml version="1.0" encoding="utf-8"?>
+<p:sld xmlns:a="http://schemas.openxmlformats.org/drawingml/2006/main" xmlns:r="http://schemas.openxmlformats.org/officeDocument/2006/relationships" xmlns:p="http://schemas.openxmlformats.org/presentationml/2006/main">
+  <p:cSld>
+    <p:spTree>
+      <p:nvGrpSpPr>
+        <p:cNvPr id="1" name=""/>
+        <p:cNvGrpSpPr/>
+        <p:nvPr/>
+      </p:nvGrpSpPr>
+      <p:grpSpPr>
+        <a:xfrm>
+          <a:off x="0" y="0"/>
+          <a:ext cx="0" cy="0"/>
+          <a:chOff x="0" y="0"/>
+          <a:chExt cx="0" cy="0"/>
+        </a:xfrm>
+      </p:grpSpPr>
+      <p:sp>
+        <p:nvSpPr>
+          <p:cNvPr id="2" name="Title 1">
+            <a:extLst>
+              <a:ext uri="{FF2B5EF4-FFF2-40B4-BE49-F238E27FC236}">
+                <a16:creationId xmlns:a16="http://schemas.microsoft.com/office/drawing/2014/main" id="{83C055B3-A1C5-4FA5-8958-0EC0D932AAEF}"/>
+              </a:ext>
+            </a:extLst>
+          </p:cNvPr>
+          <p:cNvSpPr>
+            <a:spLocks noGrp="1"/>
+          </p:cNvSpPr>
+          <p:nvPr>
+            <p:ph type="title"/>
+          </p:nvPr>
+        </p:nvSpPr>
+        <p:spPr/>
+        <p:txBody>
+          <a:bodyPr/>
+          <a:lstStyle/>
+          <a:p>
+            <a:pPr algn="ctr"/>
+            <a:r>
+              <a:rPr lang="ru-RU" dirty="0"/>
+              <a:t> </a:t>
+            </a:r>
+            <a:r>
+              <a:rPr lang="en-US" dirty="0"/>
+              <a:t>SOLID</a:t>
+            </a:r>
+          </a:p>
+        </p:txBody>
+      </p:sp>
+      <p:sp>
+        <p:nvSpPr>
+          <p:cNvPr id="3" name="Content Placeholder 2">
+            <a:extLst>
+              <a:ext uri="{FF2B5EF4-FFF2-40B4-BE49-F238E27FC236}">
+                <a16:creationId xmlns:a16="http://schemas.microsoft.com/office/drawing/2014/main" id="{A67E75BC-11C1-A1D8-1186-F69459A411E9}"/>
+              </a:ext>
+            </a:extLst>
+          </p:cNvPr>
+          <p:cNvSpPr>
+            <a:spLocks noGrp="1"/>
+          </p:cNvSpPr>
+          <p:nvPr>
+            <p:ph idx="1"/>
+          </p:nvPr>
+        </p:nvSpPr>
+        <p:spPr>
+          <a:xfrm>
+            <a:off x="677334" y="1862667"/>
+            <a:ext cx="8596668" cy="4178695"/>
+          </a:xfrm>
+        </p:spPr>
+        <p:txBody>
+          <a:bodyPr>
+            <a:normAutofit fontScale="85000" lnSpcReduction="10000"/>
+          </a:bodyPr>
+          <a:lstStyle/>
+          <a:p>
+            <a:r>
+              <a:rPr lang="ru-RU" dirty="0"/>
+              <a:t>Принцип единственной ответственности (The Single </a:t>
+            </a:r>
+            <a:r>
+              <a:rPr lang="ru-RU" dirty="0" err="1"/>
+              <a:t>Responsibility</a:t>
+            </a:r>
+            <a:r>
+              <a:rPr lang="ru-RU" dirty="0"/>
+              <a:t> </a:t>
+            </a:r>
+            <a:r>
+              <a:rPr lang="ru-RU" dirty="0" err="1"/>
+              <a:t>Principle</a:t>
+            </a:r>
+            <a:r>
+              <a:rPr lang="ru-RU" dirty="0"/>
+              <a:t>) Каждый класс выполняет лишь одну задачу.</a:t>
+            </a:r>
+          </a:p>
+          <a:p>
+            <a:r>
+              <a:rPr lang="ru-RU" dirty="0"/>
+              <a:t>Принцип открытости/закрытости (The Open </a:t>
+            </a:r>
+            <a:r>
+              <a:rPr lang="ru-RU" dirty="0" err="1"/>
+              <a:t>Closed</a:t>
+            </a:r>
+            <a:r>
+              <a:rPr lang="ru-RU" dirty="0"/>
+              <a:t> </a:t>
+            </a:r>
+            <a:r>
+              <a:rPr lang="ru-RU" dirty="0" err="1"/>
+              <a:t>Principle</a:t>
+            </a:r>
+            <a:r>
+              <a:rPr lang="ru-RU" dirty="0"/>
+              <a:t>) «программные сущности … должны быть открыты для расширения, но закрыты для модификации.»</a:t>
+            </a:r>
+          </a:p>
+          <a:p>
+            <a:r>
+              <a:rPr lang="ru-RU" dirty="0"/>
+              <a:t>Принцип подстановки Барбары Лисков (The </a:t>
+            </a:r>
+            <a:r>
+              <a:rPr lang="ru-RU" dirty="0" err="1"/>
+              <a:t>Liskov</a:t>
+            </a:r>
+            <a:r>
+              <a:rPr lang="ru-RU" dirty="0"/>
+              <a:t> </a:t>
+            </a:r>
+            <a:r>
+              <a:rPr lang="ru-RU" dirty="0" err="1"/>
+              <a:t>Substitution</a:t>
+            </a:r>
+            <a:r>
+              <a:rPr lang="ru-RU" dirty="0"/>
+              <a:t> </a:t>
+            </a:r>
+            <a:r>
+              <a:rPr lang="ru-RU" dirty="0" err="1"/>
+              <a:t>Principle</a:t>
+            </a:r>
+            <a:r>
+              <a:rPr lang="ru-RU" dirty="0"/>
+              <a:t>) «объекты в программе должны быть заменяемыми на экземпляры их подтипов без изменения правильности выполнения программы.» См. также контрактное программирование. Наследующий класс должен дополнять, а не изменять базовый.</a:t>
+            </a:r>
+          </a:p>
+          <a:p>
+            <a:r>
+              <a:rPr lang="ru-RU" dirty="0"/>
+              <a:t>Принцип разделения интерфейса (The Interface </a:t>
+            </a:r>
+            <a:r>
+              <a:rPr lang="ru-RU" dirty="0" err="1"/>
+              <a:t>Segregation</a:t>
+            </a:r>
+            <a:r>
+              <a:rPr lang="ru-RU" dirty="0"/>
+              <a:t> </a:t>
+            </a:r>
+            <a:r>
+              <a:rPr lang="ru-RU" dirty="0" err="1"/>
+              <a:t>Principle</a:t>
+            </a:r>
+            <a:r>
+              <a:rPr lang="ru-RU" dirty="0"/>
+              <a:t>) «много интерфейсов, специально предназначенных для клиентов, лучше, чем один интерфейс общего назначения.»</a:t>
+            </a:r>
+          </a:p>
+          <a:p>
+            <a:r>
+              <a:rPr lang="ru-RU" dirty="0"/>
+              <a:t>Принцип инверсии зависимостей (The </a:t>
+            </a:r>
+            <a:r>
+              <a:rPr lang="ru-RU" dirty="0" err="1"/>
+              <a:t>Dependency</a:t>
+            </a:r>
+            <a:r>
+              <a:rPr lang="ru-RU" dirty="0"/>
+              <a:t> </a:t>
+            </a:r>
+            <a:r>
+              <a:rPr lang="ru-RU" dirty="0" err="1"/>
+              <a:t>Inversion</a:t>
+            </a:r>
+            <a:r>
+              <a:rPr lang="ru-RU" dirty="0"/>
+              <a:t> </a:t>
+            </a:r>
+            <a:r>
+              <a:rPr lang="ru-RU" dirty="0" err="1"/>
+              <a:t>Principle</a:t>
+            </a:r>
+            <a:r>
+              <a:rPr lang="ru-RU" dirty="0"/>
+              <a:t>) «Зависимость на Абстракциях. Нет зависимости на что-то конкретное.»</a:t>
+            </a:r>
+          </a:p>
+          <a:p>
+            <a:pPr marL="0" indent="0">
+              <a:buNone/>
+            </a:pPr>
+            <a:br>
+              <a:rPr lang="ru-RU" dirty="0"/>
+            </a:br>
+            <a:r>
+              <a:rPr lang="ru-RU" dirty="0"/>
+              <a:t>ПС. Можно поумничать и добавить: с 70х годов смысл некоторых принципов менялся например </a:t>
+            </a:r>
+            <a:r>
+              <a:rPr lang="en-US" dirty="0"/>
+              <a:t>Open/Close </a:t>
+            </a:r>
+            <a:r>
+              <a:rPr lang="ru-RU" dirty="0"/>
+              <a:t>и </a:t>
+            </a:r>
+            <a:r>
+              <a:rPr lang="en-US" dirty="0" err="1"/>
+              <a:t>Liskov</a:t>
+            </a:r>
+            <a:r>
+              <a:rPr lang="ru-RU" dirty="0"/>
+              <a:t> </a:t>
+            </a:r>
+            <a:endParaRPr lang="en-US" dirty="0"/>
+          </a:p>
+        </p:txBody>
+      </p:sp>
+    </p:spTree>
+    <p:extLst>
+      <p:ext uri="{BB962C8B-B14F-4D97-AF65-F5344CB8AC3E}">
+        <p14:creationId xmlns:p14="http://schemas.microsoft.com/office/powerpoint/2010/main" val="1528867906"/>
+      </p:ext>
+    </p:extLst>
+  </p:cSld>
+  <p:clrMapOvr>
+    <a:masterClrMapping/>
+  </p:clrMapOvr>
+</p:sld>
+</file>
+
+<file path=ppt/slides/slide30.xml><?xml version="1.0" encoding="utf-8"?>
 <p:sld xmlns:a="http://schemas.openxmlformats.org/drawingml/2006/main" xmlns:r="http://schemas.openxmlformats.org/officeDocument/2006/relationships" xmlns:p="http://schemas.openxmlformats.org/presentationml/2006/main">
   <p:cSld>
     <p:spTree>
@@ -10708,254 +11358,7 @@
 </p:sld>
 </file>
 
-<file path=ppt/slides/slide3.xml><?xml version="1.0" encoding="utf-8"?>
-<p:sld xmlns:a="http://schemas.openxmlformats.org/drawingml/2006/main" xmlns:r="http://schemas.openxmlformats.org/officeDocument/2006/relationships" xmlns:p="http://schemas.openxmlformats.org/presentationml/2006/main">
-  <p:cSld>
-    <p:spTree>
-      <p:nvGrpSpPr>
-        <p:cNvPr id="1" name=""/>
-        <p:cNvGrpSpPr/>
-        <p:nvPr/>
-      </p:nvGrpSpPr>
-      <p:grpSpPr>
-        <a:xfrm>
-          <a:off x="0" y="0"/>
-          <a:ext cx="0" cy="0"/>
-          <a:chOff x="0" y="0"/>
-          <a:chExt cx="0" cy="0"/>
-        </a:xfrm>
-      </p:grpSpPr>
-      <p:sp>
-        <p:nvSpPr>
-          <p:cNvPr id="2" name="Title 1">
-            <a:extLst>
-              <a:ext uri="{FF2B5EF4-FFF2-40B4-BE49-F238E27FC236}">
-                <a16:creationId xmlns:a16="http://schemas.microsoft.com/office/drawing/2014/main" id="{83C055B3-A1C5-4FA5-8958-0EC0D932AAEF}"/>
-              </a:ext>
-            </a:extLst>
-          </p:cNvPr>
-          <p:cNvSpPr>
-            <a:spLocks noGrp="1"/>
-          </p:cNvSpPr>
-          <p:nvPr>
-            <p:ph type="title"/>
-          </p:nvPr>
-        </p:nvSpPr>
-        <p:spPr/>
-        <p:txBody>
-          <a:bodyPr/>
-          <a:lstStyle/>
-          <a:p>
-            <a:pPr algn="ctr"/>
-            <a:r>
-              <a:rPr lang="ru-RU" dirty="0"/>
-              <a:t> </a:t>
-            </a:r>
-            <a:r>
-              <a:rPr lang="en-US" dirty="0"/>
-              <a:t>SOLID</a:t>
-            </a:r>
-          </a:p>
-        </p:txBody>
-      </p:sp>
-      <p:sp>
-        <p:nvSpPr>
-          <p:cNvPr id="3" name="Content Placeholder 2">
-            <a:extLst>
-              <a:ext uri="{FF2B5EF4-FFF2-40B4-BE49-F238E27FC236}">
-                <a16:creationId xmlns:a16="http://schemas.microsoft.com/office/drawing/2014/main" id="{A67E75BC-11C1-A1D8-1186-F69459A411E9}"/>
-              </a:ext>
-            </a:extLst>
-          </p:cNvPr>
-          <p:cNvSpPr>
-            <a:spLocks noGrp="1"/>
-          </p:cNvSpPr>
-          <p:nvPr>
-            <p:ph idx="1"/>
-          </p:nvPr>
-        </p:nvSpPr>
-        <p:spPr>
-          <a:xfrm>
-            <a:off x="677334" y="1862667"/>
-            <a:ext cx="8596668" cy="4178695"/>
-          </a:xfrm>
-        </p:spPr>
-        <p:txBody>
-          <a:bodyPr>
-            <a:normAutofit fontScale="85000" lnSpcReduction="10000"/>
-          </a:bodyPr>
-          <a:lstStyle/>
-          <a:p>
-            <a:r>
-              <a:rPr lang="ru-RU" dirty="0"/>
-              <a:t>Принцип единственной ответственности (The Single </a:t>
-            </a:r>
-            <a:r>
-              <a:rPr lang="ru-RU" dirty="0" err="1"/>
-              <a:t>Responsibility</a:t>
-            </a:r>
-            <a:r>
-              <a:rPr lang="ru-RU" dirty="0"/>
-              <a:t> </a:t>
-            </a:r>
-            <a:r>
-              <a:rPr lang="ru-RU" dirty="0" err="1"/>
-              <a:t>Principle</a:t>
-            </a:r>
-            <a:r>
-              <a:rPr lang="ru-RU" dirty="0"/>
-              <a:t>) Каждый класс выполняет лишь одну задачу.</a:t>
-            </a:r>
-          </a:p>
-          <a:p>
-            <a:r>
-              <a:rPr lang="ru-RU" dirty="0"/>
-              <a:t>Принцип открытости/закрытости (The Open </a:t>
-            </a:r>
-            <a:r>
-              <a:rPr lang="ru-RU" dirty="0" err="1"/>
-              <a:t>Closed</a:t>
-            </a:r>
-            <a:r>
-              <a:rPr lang="ru-RU" dirty="0"/>
-              <a:t> </a:t>
-            </a:r>
-            <a:r>
-              <a:rPr lang="ru-RU" dirty="0" err="1"/>
-              <a:t>Principle</a:t>
-            </a:r>
-            <a:r>
-              <a:rPr lang="ru-RU" dirty="0"/>
-              <a:t>) «программные сущности … должны быть открыты для расширения, но закрыты для модификации.»</a:t>
-            </a:r>
-          </a:p>
-          <a:p>
-            <a:r>
-              <a:rPr lang="ru-RU" dirty="0"/>
-              <a:t>Принцип подстановки Барбары Лисков (The </a:t>
-            </a:r>
-            <a:r>
-              <a:rPr lang="ru-RU" dirty="0" err="1"/>
-              <a:t>Liskov</a:t>
-            </a:r>
-            <a:r>
-              <a:rPr lang="ru-RU" dirty="0"/>
-              <a:t> </a:t>
-            </a:r>
-            <a:r>
-              <a:rPr lang="ru-RU" dirty="0" err="1"/>
-              <a:t>Substitution</a:t>
-            </a:r>
-            <a:r>
-              <a:rPr lang="ru-RU" dirty="0"/>
-              <a:t> </a:t>
-            </a:r>
-            <a:r>
-              <a:rPr lang="ru-RU" dirty="0" err="1"/>
-              <a:t>Principle</a:t>
-            </a:r>
-            <a:r>
-              <a:rPr lang="ru-RU" dirty="0"/>
-              <a:t>) «объекты в программе должны быть заменяемыми на экземпляры их подтипов без изменения правильности выполнения программы.» См. также контрактное программирование. Наследующий класс должен дополнять, а не изменять базовый.</a:t>
-            </a:r>
-          </a:p>
-          <a:p>
-            <a:r>
-              <a:rPr lang="ru-RU" dirty="0"/>
-              <a:t>Принцип разделения интерфейса (The Interface </a:t>
-            </a:r>
-            <a:r>
-              <a:rPr lang="ru-RU" dirty="0" err="1"/>
-              <a:t>Segregation</a:t>
-            </a:r>
-            <a:r>
-              <a:rPr lang="ru-RU" dirty="0"/>
-              <a:t> </a:t>
-            </a:r>
-            <a:r>
-              <a:rPr lang="ru-RU" dirty="0" err="1"/>
-              <a:t>Principle</a:t>
-            </a:r>
-            <a:r>
-              <a:rPr lang="ru-RU" dirty="0"/>
-              <a:t>) «много интерфейсов, специально предназначенных для клиентов, лучше, чем один интерфейс общего назначения.»</a:t>
-            </a:r>
-          </a:p>
-          <a:p>
-            <a:r>
-              <a:rPr lang="ru-RU" dirty="0"/>
-              <a:t>Принцип инверсии зависимостей (The </a:t>
-            </a:r>
-            <a:r>
-              <a:rPr lang="ru-RU" dirty="0" err="1"/>
-              <a:t>Dependency</a:t>
-            </a:r>
-            <a:r>
-              <a:rPr lang="ru-RU" dirty="0"/>
-              <a:t> </a:t>
-            </a:r>
-            <a:r>
-              <a:rPr lang="ru-RU" dirty="0" err="1"/>
-              <a:t>Inversion</a:t>
-            </a:r>
-            <a:r>
-              <a:rPr lang="ru-RU" dirty="0"/>
-              <a:t> </a:t>
-            </a:r>
-            <a:r>
-              <a:rPr lang="ru-RU" dirty="0" err="1"/>
-              <a:t>Principle</a:t>
-            </a:r>
-            <a:r>
-              <a:rPr lang="ru-RU" dirty="0"/>
-              <a:t>) «Зависимость на Абстракциях. Нет зависимости на что-то конкретное.»</a:t>
-            </a:r>
-          </a:p>
-          <a:p>
-            <a:pPr marL="0" indent="0">
-              <a:buNone/>
-            </a:pPr>
-            <a:br>
-              <a:rPr lang="ru-RU" dirty="0"/>
-            </a:br>
-            <a:r>
-              <a:rPr lang="ru-RU" dirty="0"/>
-              <a:t>ПС. Можно поумничать и добавить: с 70х годов смысл некоторых принципов менялся например </a:t>
-            </a:r>
-            <a:r>
-              <a:rPr lang="en-US" dirty="0"/>
-              <a:t>Open/Close </a:t>
-            </a:r>
-            <a:r>
-              <a:rPr lang="ru-RU" dirty="0"/>
-              <a:t>и </a:t>
-            </a:r>
-            <a:r>
-              <a:rPr lang="en-US" dirty="0" err="1"/>
-              <a:t>Liskov</a:t>
-            </a:r>
-            <a:r>
-              <a:rPr lang="ru-RU" dirty="0"/>
-              <a:t> </a:t>
-            </a:r>
-            <a:endParaRPr lang="en-US" dirty="0"/>
-          </a:p>
-        </p:txBody>
-      </p:sp>
-    </p:spTree>
-    <p:extLst>
-      <p:ext uri="{BB962C8B-B14F-4D97-AF65-F5344CB8AC3E}">
-        <p14:creationId xmlns:p14="http://schemas.microsoft.com/office/powerpoint/2010/main" val="1528867906"/>
-      </p:ext>
-    </p:extLst>
-  </p:cSld>
-  <p:clrMapOvr>
-    <a:masterClrMapping/>
-  </p:clrMapOvr>
-</p:sld>
-</file>
-
-<file path=ppt/slides/slide30.xml><?xml version="1.0" encoding="utf-8"?>
+<file path=ppt/slides/slide31.xml><?xml version="1.0" encoding="utf-8"?>
 <p:sld xmlns:a="http://schemas.openxmlformats.org/drawingml/2006/main" xmlns:r="http://schemas.openxmlformats.org/officeDocument/2006/relationships" xmlns:p="http://schemas.openxmlformats.org/presentationml/2006/main">
   <p:cSld>
     <p:spTree>
@@ -11175,7 +11578,7 @@
 </p:sld>
 </file>
 
-<file path=ppt/slides/slide31.xml><?xml version="1.0" encoding="utf-8"?>
+<file path=ppt/slides/slide32.xml><?xml version="1.0" encoding="utf-8"?>
 <p:sld xmlns:a="http://schemas.openxmlformats.org/drawingml/2006/main" xmlns:r="http://schemas.openxmlformats.org/officeDocument/2006/relationships" xmlns:p="http://schemas.openxmlformats.org/presentationml/2006/main">
   <p:cSld>
     <p:spTree>
@@ -11387,7 +11790,7 @@
 </p:sld>
 </file>
 
-<file path=ppt/slides/slide32.xml><?xml version="1.0" encoding="utf-8"?>
+<file path=ppt/slides/slide33.xml><?xml version="1.0" encoding="utf-8"?>
 <p:sld xmlns:a="http://schemas.openxmlformats.org/drawingml/2006/main" xmlns:r="http://schemas.openxmlformats.org/officeDocument/2006/relationships" xmlns:p="http://schemas.openxmlformats.org/presentationml/2006/main">
   <p:cSld>
     <p:spTree>
@@ -11573,7 +11976,7 @@
 </p:sld>
 </file>
 
-<file path=ppt/slides/slide33.xml><?xml version="1.0" encoding="utf-8"?>
+<file path=ppt/slides/slide34.xml><?xml version="1.0" encoding="utf-8"?>
 <p:sld xmlns:a="http://schemas.openxmlformats.org/drawingml/2006/main" xmlns:r="http://schemas.openxmlformats.org/officeDocument/2006/relationships" xmlns:p="http://schemas.openxmlformats.org/presentationml/2006/main">
   <p:cSld>
     <p:spTree>
@@ -11703,7 +12106,7 @@
 </p:sld>
 </file>
 
-<file path=ppt/slides/slide34.xml><?xml version="1.0" encoding="utf-8"?>
+<file path=ppt/slides/slide35.xml><?xml version="1.0" encoding="utf-8"?>
 <p:sld xmlns:a="http://schemas.openxmlformats.org/drawingml/2006/main" xmlns:r="http://schemas.openxmlformats.org/officeDocument/2006/relationships" xmlns:p="http://schemas.openxmlformats.org/presentationml/2006/main">
   <p:cSld>
     <p:spTree>

</xml_diff>

<commit_message>
Update 1 slide add kafka logo
</commit_message>
<xml_diff>
--- a/Актуальные вопросы на собеседовании.pptx
+++ b/Актуальные вопросы на собеседовании.pptx
@@ -5911,9 +5911,6 @@
               <a:rPr lang="ru-RU" dirty="0"/>
               <a:t>в 2025 году</a:t>
             </a:r>
-            <a:br>
-              <a:rPr lang="en-US" dirty="0"/>
-            </a:br>
             <a:endParaRPr lang="en-US" dirty="0"/>
           </a:p>
         </p:txBody>
@@ -6057,6 +6054,42 @@
               </a14:hiddenFill>
             </a:ext>
           </a:extLst>
+        </p:spPr>
+      </p:pic>
+      <p:pic>
+        <p:nvPicPr>
+          <p:cNvPr id="5" name="Picture 4">
+            <a:extLst>
+              <a:ext uri="{FF2B5EF4-FFF2-40B4-BE49-F238E27FC236}">
+                <a16:creationId xmlns:a16="http://schemas.microsoft.com/office/drawing/2014/main" id="{62A0D691-B496-CEAE-E5A5-4626AAEAD420}"/>
+              </a:ext>
+            </a:extLst>
+          </p:cNvPr>
+          <p:cNvPicPr>
+            <a:picLocks noChangeAspect="1"/>
+          </p:cNvPicPr>
+          <p:nvPr/>
+        </p:nvPicPr>
+        <p:blipFill>
+          <a:blip r:embed="rId5">
+            <a:extLst>
+              <a:ext uri="{28A0092B-C50C-407E-A947-70E740481C1C}">
+                <a14:useLocalDpi xmlns:a14="http://schemas.microsoft.com/office/drawing/2010/main" val="0"/>
+              </a:ext>
+            </a:extLst>
+          </a:blip>
+          <a:stretch>
+            <a:fillRect/>
+          </a:stretch>
+        </p:blipFill>
+        <p:spPr>
+          <a:xfrm>
+            <a:off x="1044574" y="0"/>
+            <a:ext cx="3905250" cy="1171575"/>
+          </a:xfrm>
+          <a:prstGeom prst="rect">
+            <a:avLst/>
+          </a:prstGeom>
         </p:spPr>
       </p:pic>
     </p:spTree>

</xml_diff>